<commit_message>
Refactor the code such that all the course websites are in _courses; and change the bioimage analysis basics course to include the two new convolution and statistical filter modules
</commit_message>
<xml_diff>
--- a/figures/resources/filter_convolution.pptx
+++ b/figures/resources/filter_convolution.pptx
@@ -4645,54 +4645,6 @@
           <a:chExt cx="0" cy="0"/>
         </a:xfrm>
       </p:grpSpPr>
-      <p:sp>
-        <p:nvSpPr>
-          <p:cNvPr id="274" name="Google Shape;274;p29"/>
-          <p:cNvSpPr txBox="1">
-            <a:spLocks noGrp="1"/>
-          </p:cNvSpPr>
-          <p:nvPr>
-            <p:ph type="title"/>
-          </p:nvPr>
-        </p:nvSpPr>
-        <p:spPr>
-          <a:xfrm>
-            <a:off x="2031075" y="157723"/>
-            <a:ext cx="8129850" cy="763650"/>
-          </a:xfrm>
-          <a:prstGeom prst="rect">
-            <a:avLst/>
-          </a:prstGeom>
-          <a:noFill/>
-          <a:ln>
-            <a:noFill/>
-          </a:ln>
-        </p:spPr>
-        <p:txBody>
-          <a:bodyPr spcFirstLastPara="1" vert="horz" wrap="square" lIns="121888" tIns="121888" rIns="121888" bIns="121888" rtlCol="0" anchor="t" anchorCtr="0">
-            <a:noAutofit/>
-          </a:bodyPr>
-          <a:lstStyle/>
-          <a:p>
-            <a:pPr algn="ctr">
-              <a:buSzPts val="5800"/>
-            </a:pPr>
-            <a:r>
-              <a:rPr lang="en-US" sz="3600">
-                <a:solidFill>
-                  <a:srgbClr val="93C47D"/>
-                </a:solidFill>
-              </a:rPr>
-              <a:t>Image Processing: Convolution Filters</a:t>
-            </a:r>
-            <a:endParaRPr sz="3600">
-              <a:solidFill>
-                <a:srgbClr val="93C47D"/>
-              </a:solidFill>
-            </a:endParaRPr>
-          </a:p>
-        </p:txBody>
-      </p:sp>
       <p:sp>
         <p:nvSpPr>
           <p:cNvPr id="275" name="Google Shape;275;p29"/>

</xml_diff>